<commit_message>
small lecture changes and html through 13...
</commit_message>
<xml_diff>
--- a/classes/stats2019/Lecture11.pptx
+++ b/classes/stats2019/Lecture11.pptx
@@ -144,6 +144,11 @@
       </a:defRPr>
     </a:lvl9pPr>
   </p:defaultTextStyle>
+  <p:extLst>
+    <p:ext uri="{EFAFB233-063F-42B5-8137-9DF3F51BA10A}">
+      <p15:sldGuideLst xmlns:p15="http://schemas.microsoft.com/office/powerpoint/2012/main"/>
+    </p:ext>
+  </p:extLst>
 </p:presentation>
 </file>
 
@@ -7635,7 +7640,7 @@
           <a:graphicData uri="http://schemas.openxmlformats.org/presentationml/2006/ole">
             <mc:AlternateContent xmlns:mc="http://schemas.openxmlformats.org/markup-compatibility/2006">
               <mc:Choice xmlns:v="urn:schemas-microsoft-com:vml" Requires="v">
-                <p:oleObj spid="_x0000_s1034" name="Bitmap Image" r:id="rId4" imgW="5885714" imgH="2600000" progId="PBrush">
+                <p:oleObj spid="_x0000_s1036" name="Bitmap Image" r:id="rId4" imgW="5885714" imgH="2600000" progId="PBrush">
                   <p:embed/>
                 </p:oleObj>
               </mc:Choice>
@@ -10752,7 +10757,7 @@
           <a:graphicData uri="http://schemas.openxmlformats.org/presentationml/2006/ole">
             <mc:AlternateContent xmlns:mc="http://schemas.openxmlformats.org/markup-compatibility/2006">
               <mc:Choice xmlns:v="urn:schemas-microsoft-com:vml" Requires="v">
-                <p:oleObj spid="_x0000_s2066" name="Bitmap Image" r:id="rId4" imgW="5296639" imgH="5172797" progId="PBrush">
+                <p:oleObj spid="_x0000_s2070" name="Bitmap Image" r:id="rId4" imgW="5296639" imgH="5172797" progId="PBrush">
                   <p:embed/>
                 </p:oleObj>
               </mc:Choice>
@@ -10845,7 +10850,7 @@
           <a:graphicData uri="http://schemas.openxmlformats.org/presentationml/2006/ole">
             <mc:AlternateContent xmlns:mc="http://schemas.openxmlformats.org/markup-compatibility/2006">
               <mc:Choice xmlns:v="urn:schemas-microsoft-com:vml" Requires="v">
-                <p:oleObj spid="_x0000_s2067" name="Bitmap Image" r:id="rId6" imgW="3715269" imgH="857143" progId="PBrush">
+                <p:oleObj spid="_x0000_s2071" name="Bitmap Image" r:id="rId6" imgW="3715269" imgH="857143" progId="PBrush">
                   <p:embed/>
                 </p:oleObj>
               </mc:Choice>
@@ -11108,7 +11113,7 @@
           <a:graphicData uri="http://schemas.openxmlformats.org/presentationml/2006/ole">
             <mc:AlternateContent xmlns:mc="http://schemas.openxmlformats.org/markup-compatibility/2006">
               <mc:Choice xmlns:v="urn:schemas-microsoft-com:vml" Requires="v">
-                <p:oleObj spid="_x0000_s3098" name="Bitmap Image" r:id="rId4" imgW="3219899" imgH="685714" progId="PBrush">
+                <p:oleObj spid="_x0000_s3104" name="Bitmap Image" r:id="rId4" imgW="3219899" imgH="685714" progId="PBrush">
                   <p:embed/>
                 </p:oleObj>
               </mc:Choice>
@@ -11201,7 +11206,7 @@
           <a:graphicData uri="http://schemas.openxmlformats.org/presentationml/2006/ole">
             <mc:AlternateContent xmlns:mc="http://schemas.openxmlformats.org/markup-compatibility/2006">
               <mc:Choice xmlns:v="urn:schemas-microsoft-com:vml" Requires="v">
-                <p:oleObj spid="_x0000_s3099" name="Bitmap Image" r:id="rId6" imgW="3715269" imgH="857143" progId="PBrush">
+                <p:oleObj spid="_x0000_s3105" name="Bitmap Image" r:id="rId6" imgW="3715269" imgH="857143" progId="PBrush">
                   <p:embed/>
                 </p:oleObj>
               </mc:Choice>
@@ -11294,7 +11299,7 @@
           <a:graphicData uri="http://schemas.openxmlformats.org/presentationml/2006/ole">
             <mc:AlternateContent xmlns:mc="http://schemas.openxmlformats.org/markup-compatibility/2006">
               <mc:Choice xmlns:v="urn:schemas-microsoft-com:vml" Requires="v">
-                <p:oleObj spid="_x0000_s3100" name="Bitmap Image" r:id="rId8" imgW="5372850" imgH="5152381" progId="PBrush">
+                <p:oleObj spid="_x0000_s3106" name="Bitmap Image" r:id="rId8" imgW="5372850" imgH="5152381" progId="PBrush">
                   <p:embed/>
                 </p:oleObj>
               </mc:Choice>
@@ -11483,7 +11488,7 @@
           <a:graphicData uri="http://schemas.openxmlformats.org/presentationml/2006/ole">
             <mc:AlternateContent xmlns:mc="http://schemas.openxmlformats.org/markup-compatibility/2006">
               <mc:Choice xmlns:v="urn:schemas-microsoft-com:vml" Requires="v">
-                <p:oleObj spid="_x0000_s4114" name="Bitmap Image" r:id="rId4" imgW="4029637" imgH="1895238" progId="PBrush">
+                <p:oleObj spid="_x0000_s4118" name="Bitmap Image" r:id="rId4" imgW="4029637" imgH="1895238" progId="PBrush">
                   <p:embed/>
                 </p:oleObj>
               </mc:Choice>
@@ -11576,7 +11581,7 @@
           <a:graphicData uri="http://schemas.openxmlformats.org/presentationml/2006/ole">
             <mc:AlternateContent xmlns:mc="http://schemas.openxmlformats.org/markup-compatibility/2006">
               <mc:Choice xmlns:v="urn:schemas-microsoft-com:vml" Requires="v">
-                <p:oleObj spid="_x0000_s4115" name="Bitmap Image" r:id="rId6" imgW="6354062" imgH="5952381" progId="PBrush">
+                <p:oleObj spid="_x0000_s4119" name="Bitmap Image" r:id="rId6" imgW="6354062" imgH="5952381" progId="PBrush">
                   <p:embed/>
                 </p:oleObj>
               </mc:Choice>
@@ -13856,7 +13861,7 @@
         <p:spPr>
           <a:xfrm>
             <a:off x="178130" y="4132613"/>
-            <a:ext cx="5262979" cy="1754326"/>
+            <a:ext cx="5327099" cy="1754326"/>
           </a:xfrm>
           <a:prstGeom prst="rect">
             <a:avLst/>
@@ -13907,19 +13912,8 @@
                 <a:latin typeface="Arial" panose="020B0604020202020204" pitchFamily="34" charset="0"/>
                 <a:cs typeface="Arial" panose="020B0604020202020204" pitchFamily="34" charset="0"/>
               </a:rPr>
-              <a:t>agree on which genes are the most </a:t>
-            </a:r>
-            <a:r>
-              <a:rPr lang="en-US" dirty="0" err="1">
-                <a:latin typeface="Arial" panose="020B0604020202020204" pitchFamily="34" charset="0"/>
-                <a:cs typeface="Arial" panose="020B0604020202020204" pitchFamily="34" charset="0"/>
-              </a:rPr>
-              <a:t>significant,but</a:t>
-            </a:r>
-            <a:endParaRPr lang="en-US" dirty="0">
-              <a:latin typeface="Arial" panose="020B0604020202020204" pitchFamily="34" charset="0"/>
-              <a:cs typeface="Arial" panose="020B0604020202020204" pitchFamily="34" charset="0"/>
-            </a:endParaRPr>
+              <a:t>agree on which genes are the most significant, but</a:t>
+            </a:r>
           </a:p>
           <a:p>
             <a:r>

</xml_diff>